<commit_message>
Début BlocIf Pratiquement fini
</commit_message>
<xml_diff>
--- a/Ébauche du projet/Projet Sim CODE WARS.pptx
+++ b/Ébauche du projet/Projet Sim CODE WARS.pptx
@@ -1380,7 +1380,7 @@
           <a:p>
             <a:fld id="{12241623-A064-4BED-B073-BA4D61433402}" type="datetime1">
               <a:rPr lang="en-US" smtClean="0"/>
-              <a:t>2/15/2023</a:t>
+              <a:t>5/10/2023</a:t>
             </a:fld>
             <a:endParaRPr lang="en-US" dirty="0"/>
           </a:p>
@@ -1449,7 +1449,7 @@
             <a:fld id="{FAEF9944-A4F6-4C59-AEBD-678D6480B8EA}" type="slidenum">
               <a:rPr lang="en-US" smtClean="0"/>
               <a:pPr/>
-              <a:t>‹N°›</a:t>
+              <a:t>‹n°›</a:t>
             </a:fld>
             <a:endParaRPr lang="en-US" dirty="0"/>
           </a:p>
@@ -2191,7 +2191,7 @@
           <a:p>
             <a:fld id="{6F86ED0C-1DA7-41F0-94CF-6218B1FEDFF1}" type="datetime1">
               <a:rPr lang="en-US" smtClean="0"/>
-              <a:t>2/15/2023</a:t>
+              <a:t>5/10/2023</a:t>
             </a:fld>
             <a:endParaRPr lang="en-US" dirty="0"/>
           </a:p>
@@ -2247,7 +2247,7 @@
             <a:fld id="{FAEF9944-A4F6-4C59-AEBD-678D6480B8EA}" type="slidenum">
               <a:rPr lang="en-US" smtClean="0"/>
               <a:pPr algn="l"/>
-              <a:t>‹N°›</a:t>
+              <a:t>‹n°›</a:t>
             </a:fld>
             <a:endParaRPr lang="en-US" dirty="0"/>
           </a:p>
@@ -2390,7 +2390,7 @@
           <a:p>
             <a:fld id="{EECF02AB-6034-4B88-BC5A-7C17CB0EF809}" type="datetime1">
               <a:rPr lang="en-US" smtClean="0"/>
-              <a:t>2/15/2023</a:t>
+              <a:t>5/10/2023</a:t>
             </a:fld>
             <a:endParaRPr lang="en-US" dirty="0"/>
           </a:p>
@@ -2447,7 +2447,7 @@
             <a:fld id="{FAEF9944-A4F6-4C59-AEBD-678D6480B8EA}" type="slidenum">
               <a:rPr lang="en-US" smtClean="0"/>
               <a:pPr/>
-              <a:t>‹N°›</a:t>
+              <a:t>‹n°›</a:t>
             </a:fld>
             <a:endParaRPr lang="en-US" dirty="0"/>
           </a:p>
@@ -2625,7 +2625,7 @@
           <a:p>
             <a:fld id="{22F3E5F3-28EE-488F-BD53-B744C06C3DEC}" type="datetime1">
               <a:rPr lang="en-US" smtClean="0"/>
-              <a:t>2/15/2023</a:t>
+              <a:t>5/10/2023</a:t>
             </a:fld>
             <a:endParaRPr lang="en-US" dirty="0"/>
           </a:p>
@@ -2681,7 +2681,7 @@
             <a:fld id="{FAEF9944-A4F6-4C59-AEBD-678D6480B8EA}" type="slidenum">
               <a:rPr lang="en-US" smtClean="0"/>
               <a:pPr algn="l"/>
-              <a:t>‹N°›</a:t>
+              <a:t>‹n°›</a:t>
             </a:fld>
             <a:endParaRPr lang="en-US" dirty="0"/>
           </a:p>
@@ -5152,7 +5152,7 @@
             <a:fld id="{FAEF9944-A4F6-4C59-AEBD-678D6480B8EA}" type="slidenum">
               <a:rPr lang="en-US" smtClean="0"/>
               <a:pPr algn="l"/>
-              <a:t>‹N°›</a:t>
+              <a:t>‹n°›</a:t>
             </a:fld>
             <a:endParaRPr lang="en-US" dirty="0"/>
           </a:p>
@@ -5318,7 +5318,7 @@
           <a:p>
             <a:fld id="{E72EB70D-CD01-44DA-83B3-8FEB3383D307}" type="datetime1">
               <a:rPr lang="en-US" smtClean="0"/>
-              <a:t>2/15/2023</a:t>
+              <a:t>5/10/2023</a:t>
             </a:fld>
             <a:endParaRPr lang="en-US" dirty="0"/>
           </a:p>
@@ -5514,7 +5514,7 @@
           <a:p>
             <a:fld id="{D0158CFD-9357-46BE-A189-D637A67C8730}" type="datetime1">
               <a:rPr lang="en-US" smtClean="0"/>
-              <a:t>2/15/2023</a:t>
+              <a:t>5/10/2023</a:t>
             </a:fld>
             <a:endParaRPr lang="en-US" dirty="0"/>
           </a:p>
@@ -5570,7 +5570,7 @@
             <a:fld id="{FAEF9944-A4F6-4C59-AEBD-678D6480B8EA}" type="slidenum">
               <a:rPr lang="en-US" smtClean="0"/>
               <a:pPr algn="l"/>
-              <a:t>‹N°›</a:t>
+              <a:t>‹n°›</a:t>
             </a:fld>
             <a:endParaRPr lang="en-US" dirty="0"/>
           </a:p>
@@ -5903,7 +5903,7 @@
           <a:p>
             <a:fld id="{7B4742EE-B331-4632-BD10-A82FED6B6FC0}" type="datetime1">
               <a:rPr lang="en-US" smtClean="0"/>
-              <a:t>2/15/2023</a:t>
+              <a:t>5/10/2023</a:t>
             </a:fld>
             <a:endParaRPr lang="en-US" dirty="0"/>
           </a:p>
@@ -5959,7 +5959,7 @@
             <a:fld id="{FAEF9944-A4F6-4C59-AEBD-678D6480B8EA}" type="slidenum">
               <a:rPr lang="en-US" smtClean="0"/>
               <a:pPr algn="l"/>
-              <a:t>‹N°›</a:t>
+              <a:t>‹n°›</a:t>
             </a:fld>
             <a:endParaRPr lang="en-US" dirty="0"/>
           </a:p>
@@ -6069,7 +6069,7 @@
           <a:p>
             <a:fld id="{451BA835-D13F-49F4-8F11-5D576AC65FAD}" type="datetime1">
               <a:rPr lang="en-US" smtClean="0"/>
-              <a:t>2/15/2023</a:t>
+              <a:t>5/10/2023</a:t>
             </a:fld>
             <a:endParaRPr lang="en-US" dirty="0"/>
           </a:p>
@@ -6125,7 +6125,7 @@
             <a:fld id="{FAEF9944-A4F6-4C59-AEBD-678D6480B8EA}" type="slidenum">
               <a:rPr lang="en-US" smtClean="0"/>
               <a:pPr algn="l"/>
-              <a:t>‹N°›</a:t>
+              <a:t>‹n°›</a:t>
             </a:fld>
             <a:endParaRPr lang="en-US" dirty="0"/>
           </a:p>
@@ -6192,7 +6192,7 @@
           <a:p>
             <a:fld id="{ADBD1799-ACB5-4CB2-86A2-5C574F1C8706}" type="datetime1">
               <a:rPr lang="en-US" smtClean="0"/>
-              <a:t>2/15/2023</a:t>
+              <a:t>5/10/2023</a:t>
             </a:fld>
             <a:endParaRPr lang="en-US" dirty="0"/>
           </a:p>
@@ -6248,7 +6248,7 @@
             <a:fld id="{FAEF9944-A4F6-4C59-AEBD-678D6480B8EA}" type="slidenum">
               <a:rPr lang="en-US" smtClean="0"/>
               <a:pPr algn="l"/>
-              <a:t>‹N°›</a:t>
+              <a:t>‹n°›</a:t>
             </a:fld>
             <a:endParaRPr lang="en-US" dirty="0"/>
           </a:p>
@@ -6502,7 +6502,7 @@
           <a:p>
             <a:fld id="{ED5DD0D6-7A82-473E-879B-C6ECD6CCCFEC}" type="datetime1">
               <a:rPr lang="en-US" smtClean="0"/>
-              <a:t>2/15/2023</a:t>
+              <a:t>5/10/2023</a:t>
             </a:fld>
             <a:endParaRPr lang="en-US" dirty="0"/>
           </a:p>
@@ -6563,7 +6563,7 @@
             <a:fld id="{FAEF9944-A4F6-4C59-AEBD-678D6480B8EA}" type="slidenum">
               <a:rPr lang="en-US" smtClean="0"/>
               <a:pPr algn="l"/>
-              <a:t>‹N°›</a:t>
+              <a:t>‹n°›</a:t>
             </a:fld>
             <a:endParaRPr lang="en-US" dirty="0"/>
           </a:p>
@@ -6802,7 +6802,7 @@
           <a:p>
             <a:fld id="{D4605E03-BC17-41A7-854C-DFAB672737DC}" type="datetime1">
               <a:rPr lang="en-US" smtClean="0"/>
-              <a:t>2/15/2023</a:t>
+              <a:t>5/10/2023</a:t>
             </a:fld>
             <a:endParaRPr lang="en-US" dirty="0"/>
           </a:p>
@@ -6878,7 +6878,7 @@
             <a:fld id="{FAEF9944-A4F6-4C59-AEBD-678D6480B8EA}" type="slidenum">
               <a:rPr lang="en-US" smtClean="0"/>
               <a:pPr algn="l"/>
-              <a:t>‹N°›</a:t>
+              <a:t>‹n°›</a:t>
             </a:fld>
             <a:endParaRPr lang="en-US" dirty="0"/>
           </a:p>
@@ -7054,7 +7054,7 @@
           <a:p>
             <a:fld id="{C4408324-A84C-4A45-93B6-78D079CCE772}" type="datetime1">
               <a:rPr lang="en-US" smtClean="0"/>
-              <a:t>2/15/2023</a:t>
+              <a:t>5/10/2023</a:t>
             </a:fld>
             <a:endParaRPr lang="en-US" dirty="0"/>
           </a:p>
@@ -7138,7 +7138,7 @@
             <a:fld id="{FAEF9944-A4F6-4C59-AEBD-678D6480B8EA}" type="slidenum">
               <a:rPr lang="en-US" smtClean="0"/>
               <a:pPr algn="l"/>
-              <a:t>‹N°›</a:t>
+              <a:t>‹n°›</a:t>
             </a:fld>
             <a:endParaRPr lang="en-US" dirty="0"/>
           </a:p>
@@ -8679,10 +8679,23 @@
                 <a:ea typeface="Calibri" panose="020F0502020204030204" pitchFamily="34" charset="0"/>
                 <a:cs typeface="Times New Roman" panose="02020603050405020304" pitchFamily="18" charset="0"/>
               </a:rPr>
-              <a:t>Le jeu se déroule sur une carte quadrillée par des carreaux. Les unités peuvent se déplacer par les arrêtes d’une case. Toutes les unités peuvent aussi attaquer leur ennemi avec différent type d’attaque. Le but d’un niveau est de battre l’ennemi et/ou remplir les objectifs de missions. Le jeu est un tour par tour. Pour chaque tour, il y a deux phases, la phase de mouvement ou toutes les unités bougent et puis la phase d’attaque dans lequel toutes les unités attaquent s’ils y ont été commandé.</a:t>
+              <a:t>Le jeu se déroule sur un chemin de terre par des distances régulière. Les unités peuvent se déplacer </a:t>
             </a:r>
-          </a:p>
-          <a:p>
+            <a:r>
+              <a:rPr lang="fr-CA" sz="1800" dirty="0">
+                <a:ea typeface="Calibri" panose="020F0502020204030204" pitchFamily="34" charset="0"/>
+                <a:cs typeface="Times New Roman" panose="02020603050405020304" pitchFamily="18" charset="0"/>
+              </a:rPr>
+              <a:t>vers leur gauche, droite, en face ou en arrière</a:t>
+            </a:r>
+            <a:r>
+              <a:rPr lang="fr-CA" sz="1800" dirty="0">
+                <a:effectLst/>
+                <a:ea typeface="Calibri" panose="020F0502020204030204" pitchFamily="34" charset="0"/>
+                <a:cs typeface="Times New Roman" panose="02020603050405020304" pitchFamily="18" charset="0"/>
+              </a:rPr>
+              <a:t>. Toutes les unités peuvent aussi attaquer leur ennemi avec différent type d’attaque. Le but d’un niveau est de battre l’ennemi et/ou remplir les objectifs de missions. Le jeu opère en temps pseudo-réel. Chaque troupe avance dans le code en même temps, mais le code ne prends jamais de pause.</a:t>
+            </a:r>
             <a:endParaRPr lang="fr-CA" dirty="0"/>
           </a:p>
         </p:txBody>
@@ -8817,17 +8830,13 @@
           <a:p>
             <a:r>
               <a:rPr lang="fr-CA" sz="2200" dirty="0"/>
-              <a:t>2.Archer : Il attaque à distance a l’aide d’une flèche qui prend deux tours à atterrir et bouge de deux case par tour</a:t>
+              <a:t>2.Archer : Il attaque à distance a l’aide d’une flèche qui prend deux tours à atterrir et bouge de deux fois la vitesse normale.</a:t>
             </a:r>
           </a:p>
           <a:p>
             <a:r>
               <a:rPr lang="fr-CA" sz="2200" dirty="0"/>
-              <a:t>3.Barbare : Il attaque aux corps à corps et il peut bouger de deux cases par tour. Lorsque sa vie tombe en dessous de 20%, il se déplace maintenant de 3 case et fait 2x de dommage cependant, au prochain coups qu’il prendra, il </a:t>
-            </a:r>
-            <a:r>
-              <a:rPr lang="fr-CA" sz="2200" dirty="0" err="1"/>
-              <a:t>moura</a:t>
+              <a:t>3.Barbare : Il attaque aux corps à corps et il peut bouger de deux cases par tour. Lorsque sa vie tombe en dessous de 20%, il se déplace maintenant 3 fois plus vite et fait 2x de dommage cependant, au prochain coups qu’il prendra, il mourra</a:t>
             </a:r>
             <a:r>
               <a:rPr lang="fr-CA" dirty="0"/>
@@ -8947,23 +8956,7 @@
           <a:p>
             <a:r>
               <a:rPr lang="fr-CA" dirty="0"/>
-              <a:t>4. Les mages attaquent à distance, un peu moins loin que les archer, mais leur attaque est instantané. Il bouge d’une case par tour. Ils </a:t>
-            </a:r>
-            <a:r>
-              <a:rPr lang="fr-CA" dirty="0" err="1"/>
-              <a:t>posséde</a:t>
-            </a:r>
-            <a:r>
-              <a:rPr lang="fr-CA" dirty="0"/>
-              <a:t>, aux début de la partie, un </a:t>
-            </a:r>
-            <a:r>
-              <a:rPr lang="fr-CA" dirty="0" err="1"/>
-              <a:t>élement</a:t>
-            </a:r>
-            <a:r>
-              <a:rPr lang="fr-CA" dirty="0"/>
-              <a:t> auquel ses attaques font se fier.    </a:t>
+              <a:t>4. Les mages attaquent à distance, un peu moins loin que les archer, mais leur attaque est instantané. Il bouge à la vitesse de base.</a:t>
             </a:r>
           </a:p>
         </p:txBody>
@@ -13512,7 +13505,7 @@
           <a:p>
             <a:r>
               <a:rPr lang="fr-CA" dirty="0"/>
-              <a:t>Nous voulions faire un jeux éducatif qui reste amusant et intéressant a jouer. On a alors eu l’idée de faire un jeux qui permettrait de faire apprendre la programmation. On a alors chercher une technique simple pour faire apprendre la programmation. Notre idée est donc le Code par bloc.</a:t>
+              <a:t>Nous voulions faire un jeux éducatif qui reste amusant et intéressant a jouer. On a alors eu l’idée de faire un jeux qui permettrait de faire apprendre la programmation. On a alors chercher un langage simple pour faciliter l’apprentissage la programmation. Notre idée est donc le code par bloc.</a:t>
             </a:r>
           </a:p>
         </p:txBody>
@@ -14415,39 +14408,31 @@
             </a:r>
             <a:r>
               <a:rPr lang="en-US" dirty="0" err="1"/>
-              <a:t>consiste</a:t>
+              <a:t>simplifie</a:t>
             </a:r>
             <a:r>
               <a:rPr lang="en-US" dirty="0"/>
-              <a:t> à simplifier le code, </a:t>
+              <a:t> la </a:t>
             </a:r>
             <a:r>
               <a:rPr lang="en-US" dirty="0" err="1"/>
-              <a:t>en</a:t>
+              <a:t>syntaxe</a:t>
             </a:r>
             <a:r>
               <a:rPr lang="en-US" dirty="0"/>
-              <a:t>  </a:t>
+              <a:t> des </a:t>
             </a:r>
             <a:r>
               <a:rPr lang="en-US" dirty="0" err="1"/>
-              <a:t>mettant</a:t>
+              <a:t>programmes</a:t>
             </a:r>
             <a:r>
               <a:rPr lang="en-US" dirty="0"/>
-              <a:t> sous la </a:t>
+              <a:t> pour </a:t>
             </a:r>
             <a:r>
               <a:rPr lang="en-US" dirty="0" err="1"/>
-              <a:t>forme</a:t>
-            </a:r>
-            <a:r>
-              <a:rPr lang="en-US" dirty="0"/>
-              <a:t> de petit bloc, les variables et les </a:t>
-            </a:r>
-            <a:r>
-              <a:rPr lang="en-US" dirty="0" err="1"/>
-              <a:t>différentes</a:t>
+              <a:t>fournir</a:t>
             </a:r>
             <a:r>
               <a:rPr lang="en-US" dirty="0"/>
@@ -14455,19 +14440,75 @@
             </a:r>
             <a:r>
               <a:rPr lang="en-US" dirty="0" err="1"/>
-              <a:t>foncitons</a:t>
+              <a:t>une</a:t>
             </a:r>
             <a:r>
               <a:rPr lang="en-US" dirty="0"/>
-              <a:t>(if... else, while ,</a:t>
+              <a:t> </a:t>
             </a:r>
             <a:r>
               <a:rPr lang="en-US" dirty="0" err="1"/>
-              <a:t>etc</a:t>
+              <a:t>porte</a:t>
             </a:r>
             <a:r>
               <a:rPr lang="en-US" dirty="0"/>
-              <a:t>).</a:t>
+              <a:t> </a:t>
+            </a:r>
+            <a:r>
+              <a:rPr lang="en-US" dirty="0" err="1"/>
+              <a:t>d’entrée</a:t>
+            </a:r>
+            <a:r>
+              <a:rPr lang="en-US" dirty="0"/>
+              <a:t> au </a:t>
+            </a:r>
+            <a:r>
+              <a:rPr lang="en-US" dirty="0" err="1"/>
+              <a:t>débutant</a:t>
+            </a:r>
+            <a:r>
+              <a:rPr lang="en-US" dirty="0"/>
+              <a:t>. En revanche, </a:t>
+            </a:r>
+            <a:r>
+              <a:rPr lang="en-US" dirty="0" err="1"/>
+              <a:t>sa</a:t>
+            </a:r>
+            <a:r>
+              <a:rPr lang="en-US" dirty="0"/>
+              <a:t> nature le rend </a:t>
+            </a:r>
+            <a:r>
+              <a:rPr lang="en-US" dirty="0" err="1"/>
+              <a:t>plutôt</a:t>
+            </a:r>
+            <a:r>
+              <a:rPr lang="en-US" dirty="0"/>
+              <a:t> </a:t>
+            </a:r>
+            <a:r>
+              <a:rPr lang="en-US" dirty="0" err="1"/>
+              <a:t>restreint</a:t>
+            </a:r>
+            <a:r>
+              <a:rPr lang="en-US" dirty="0"/>
+              <a:t> dans </a:t>
+            </a:r>
+            <a:r>
+              <a:rPr lang="en-US" dirty="0" err="1"/>
+              <a:t>ses</a:t>
+            </a:r>
+            <a:r>
+              <a:rPr lang="en-US" dirty="0"/>
+              <a:t> champs </a:t>
+            </a:r>
+            <a:r>
+              <a:rPr lang="en-US" dirty="0" err="1"/>
+              <a:t>d’applications</a:t>
+            </a:r>
+            <a:r>
+              <a:rPr lang="en-US" dirty="0"/>
+              <a:t>.</a:t>
             </a:r>
           </a:p>
         </p:txBody>
@@ -14816,7 +14857,7 @@
           <a:p>
             <a:r>
               <a:rPr lang="fr-CA" dirty="0"/>
-              <a:t>Animation de ton armé pour détruire l’ennemie : Ton armé se déplace selon le code que tu auras fait avec les bloc</a:t>
+              <a:t>Animation de ton armée pour détruire l’ennemie : Ton armée se déplace selon le code que tu auras fait avec les bloc</a:t>
             </a:r>
           </a:p>
         </p:txBody>
@@ -14969,7 +15010,12 @@
             <p:ph type="title"/>
           </p:nvPr>
         </p:nvSpPr>
-        <p:spPr/>
+        <p:spPr>
+          <a:xfrm>
+            <a:off x="8476487" y="1503910"/>
+            <a:ext cx="3410713" cy="1687924"/>
+          </a:xfrm>
+        </p:spPr>
         <p:txBody>
           <a:bodyPr/>
           <a:lstStyle/>
@@ -15004,7 +15050,7 @@
           <a:p>
             <a:r>
               <a:rPr lang="fr-CA" dirty="0"/>
-              <a:t>Nous allons faire notre jeu sur </a:t>
+              <a:t>Pour faire ce projet, nous avons utiliser la plateforme </a:t>
             </a:r>
             <a:r>
               <a:rPr lang="fr-CA" dirty="0" err="1"/>
@@ -15012,23 +15058,7 @@
             </a:r>
             <a:r>
               <a:rPr lang="fr-CA" dirty="0"/>
-              <a:t>. C’est une des principales difficultés de notre projet, car c’est la première fois que nous </a:t>
-            </a:r>
-            <a:r>
-              <a:rPr lang="fr-CA" dirty="0" err="1"/>
-              <a:t>utiisons</a:t>
-            </a:r>
-            <a:r>
-              <a:rPr lang="fr-CA" dirty="0"/>
-              <a:t> </a:t>
-            </a:r>
-            <a:r>
-              <a:rPr lang="fr-CA" dirty="0" err="1"/>
-              <a:t>Unity</a:t>
-            </a:r>
-            <a:r>
-              <a:rPr lang="fr-CA" dirty="0"/>
-              <a:t>.</a:t>
+              <a:t>. </a:t>
             </a:r>
           </a:p>
         </p:txBody>
@@ -15122,7 +15152,7 @@
           <a:p>
             <a:r>
               <a:rPr lang="fr-CA" dirty="0"/>
-              <a:t>Technologie</a:t>
+              <a:t>Technologie (Difficultés)</a:t>
             </a:r>
           </a:p>
         </p:txBody>
@@ -15148,9 +15178,12 @@
           <a:bodyPr/>
           <a:lstStyle/>
           <a:p>
+            <a:pPr marL="342900" indent="-342900">
+              <a:buAutoNum type="arabicPeriod"/>
+            </a:pPr>
             <a:r>
               <a:rPr lang="fr-CA" dirty="0"/>
-              <a:t>Nous allons aussi devoir se familiariser avec les scripts dans </a:t>
+              <a:t>Apprendre </a:t>
             </a:r>
             <a:r>
               <a:rPr lang="fr-CA" dirty="0" err="1"/>
@@ -15158,13 +15191,17 @@
             </a:r>
             <a:r>
               <a:rPr lang="fr-CA" dirty="0"/>
-              <a:t>. Les scripts se font avec </a:t>
+              <a:t>, classe inconnu</a:t>
             </a:r>
+          </a:p>
+          <a:p>
+            <a:pPr marL="342900" indent="-342900">
+              <a:buAutoNum type="arabicPeriod"/>
+            </a:pPr>
             <a:r>
-              <a:rPr lang="fr-CA" dirty="0" err="1"/>
-              <a:t>c#</a:t>
+              <a:rPr lang="fr-CA" dirty="0"/>
+              <a:t>GitHub, problème de merge</a:t>
             </a:r>
-            <a:endParaRPr lang="fr-CA" dirty="0"/>
           </a:p>
         </p:txBody>
       </p:sp>
@@ -15249,7 +15286,7 @@
           <a:p>
             <a:r>
               <a:rPr lang="fr-CA" dirty="0"/>
-              <a:t>Le jeu se situe dans un monde fictif avec une esthétique scandinave.</a:t>
+              <a:t>Notre jeu se situe dans un monde fictif</a:t>
             </a:r>
           </a:p>
         </p:txBody>
@@ -15284,36 +15321,6 @@
           </a:p>
         </p:txBody>
       </p:sp>
-      <p:pic>
-        <p:nvPicPr>
-          <p:cNvPr id="6" name="Image 5">
-            <a:extLst>
-              <a:ext uri="{FF2B5EF4-FFF2-40B4-BE49-F238E27FC236}">
-                <a16:creationId xmlns:a16="http://schemas.microsoft.com/office/drawing/2014/main" id="{1C5A94F1-4A37-B507-77C3-E402AC98AEFB}"/>
-              </a:ext>
-            </a:extLst>
-          </p:cNvPr>
-          <p:cNvPicPr>
-            <a:picLocks noChangeAspect="1"/>
-          </p:cNvPicPr>
-          <p:nvPr/>
-        </p:nvPicPr>
-        <p:blipFill>
-          <a:blip r:embed="rId2"/>
-          <a:stretch>
-            <a:fillRect/>
-          </a:stretch>
-        </p:blipFill>
-        <p:spPr>
-          <a:xfrm>
-            <a:off x="487796" y="1796716"/>
-            <a:ext cx="7741803" cy="4876800"/>
-          </a:xfrm>
-          <a:prstGeom prst="rect">
-            <a:avLst/>
-          </a:prstGeom>
-        </p:spPr>
-      </p:pic>
     </p:spTree>
     <p:extLst>
       <p:ext uri="{BB962C8B-B14F-4D97-AF65-F5344CB8AC3E}">

</xml_diff>